<commit_message>
New definition of MarvInputs.
</commit_message>
<xml_diff>
--- a/Docs/MarvInputs.pptx
+++ b/Docs/MarvInputs.pptx
@@ -6,6 +6,8 @@
   </p:sldMasterIdLst>
   <p:sldIdLst>
     <p:sldId id="256" r:id="rId2"/>
+    <p:sldId id="258" r:id="rId3"/>
+    <p:sldId id="257" r:id="rId4"/>
   </p:sldIdLst>
   <p:sldSz cx="9144000" cy="6858000" type="screen4x3"/>
   <p:notesSz cx="6858000" cy="9144000"/>
@@ -288,7 +290,7 @@
           <a:p>
             <a:fld id="{530D3C23-4B65-4B60-B3DE-F74CDA8EFA57}" type="datetimeFigureOut">
               <a:rPr lang="en-US" smtClean="0"/>
-              <a:t>3/12/2013</a:t>
+              <a:t>5/16/2013</a:t>
             </a:fld>
             <a:endParaRPr lang="en-US"/>
           </a:p>
@@ -458,7 +460,7 @@
           <a:p>
             <a:fld id="{530D3C23-4B65-4B60-B3DE-F74CDA8EFA57}" type="datetimeFigureOut">
               <a:rPr lang="en-US" smtClean="0"/>
-              <a:t>3/12/2013</a:t>
+              <a:t>5/16/2013</a:t>
             </a:fld>
             <a:endParaRPr lang="en-US"/>
           </a:p>
@@ -638,7 +640,7 @@
           <a:p>
             <a:fld id="{530D3C23-4B65-4B60-B3DE-F74CDA8EFA57}" type="datetimeFigureOut">
               <a:rPr lang="en-US" smtClean="0"/>
-              <a:t>3/12/2013</a:t>
+              <a:t>5/16/2013</a:t>
             </a:fld>
             <a:endParaRPr lang="en-US"/>
           </a:p>
@@ -808,7 +810,7 @@
           <a:p>
             <a:fld id="{530D3C23-4B65-4B60-B3DE-F74CDA8EFA57}" type="datetimeFigureOut">
               <a:rPr lang="en-US" smtClean="0"/>
-              <a:t>3/12/2013</a:t>
+              <a:t>5/16/2013</a:t>
             </a:fld>
             <a:endParaRPr lang="en-US"/>
           </a:p>
@@ -1054,7 +1056,7 @@
           <a:p>
             <a:fld id="{530D3C23-4B65-4B60-B3DE-F74CDA8EFA57}" type="datetimeFigureOut">
               <a:rPr lang="en-US" smtClean="0"/>
-              <a:t>3/12/2013</a:t>
+              <a:t>5/16/2013</a:t>
             </a:fld>
             <a:endParaRPr lang="en-US"/>
           </a:p>
@@ -1342,7 +1344,7 @@
           <a:p>
             <a:fld id="{530D3C23-4B65-4B60-B3DE-F74CDA8EFA57}" type="datetimeFigureOut">
               <a:rPr lang="en-US" smtClean="0"/>
-              <a:t>3/12/2013</a:t>
+              <a:t>5/16/2013</a:t>
             </a:fld>
             <a:endParaRPr lang="en-US"/>
           </a:p>
@@ -1764,7 +1766,7 @@
           <a:p>
             <a:fld id="{530D3C23-4B65-4B60-B3DE-F74CDA8EFA57}" type="datetimeFigureOut">
               <a:rPr lang="en-US" smtClean="0"/>
-              <a:t>3/12/2013</a:t>
+              <a:t>5/16/2013</a:t>
             </a:fld>
             <a:endParaRPr lang="en-US"/>
           </a:p>
@@ -1882,7 +1884,7 @@
           <a:p>
             <a:fld id="{530D3C23-4B65-4B60-B3DE-F74CDA8EFA57}" type="datetimeFigureOut">
               <a:rPr lang="en-US" smtClean="0"/>
-              <a:t>3/12/2013</a:t>
+              <a:t>5/16/2013</a:t>
             </a:fld>
             <a:endParaRPr lang="en-US"/>
           </a:p>
@@ -1977,7 +1979,7 @@
           <a:p>
             <a:fld id="{530D3C23-4B65-4B60-B3DE-F74CDA8EFA57}" type="datetimeFigureOut">
               <a:rPr lang="en-US" smtClean="0"/>
-              <a:t>3/12/2013</a:t>
+              <a:t>5/16/2013</a:t>
             </a:fld>
             <a:endParaRPr lang="en-US"/>
           </a:p>
@@ -2254,7 +2256,7 @@
           <a:p>
             <a:fld id="{530D3C23-4B65-4B60-B3DE-F74CDA8EFA57}" type="datetimeFigureOut">
               <a:rPr lang="en-US" smtClean="0"/>
-              <a:t>3/12/2013</a:t>
+              <a:t>5/16/2013</a:t>
             </a:fld>
             <a:endParaRPr lang="en-US"/>
           </a:p>
@@ -2507,7 +2509,7 @@
           <a:p>
             <a:fld id="{530D3C23-4B65-4B60-B3DE-F74CDA8EFA57}" type="datetimeFigureOut">
               <a:rPr lang="en-US" smtClean="0"/>
-              <a:t>3/12/2013</a:t>
+              <a:t>5/16/2013</a:t>
             </a:fld>
             <a:endParaRPr lang="en-US"/>
           </a:p>
@@ -2720,7 +2722,7 @@
           <a:p>
             <a:fld id="{530D3C23-4B65-4B60-B3DE-F74CDA8EFA57}" type="datetimeFigureOut">
               <a:rPr lang="en-US" smtClean="0"/>
-              <a:t>3/12/2013</a:t>
+              <a:t>5/16/2013</a:t>
             </a:fld>
             <a:endParaRPr lang="en-US"/>
           </a:p>
@@ -3104,14 +3106,14 @@
           <p:nvPr>
             <p:extLst>
               <p:ext uri="{D42A27DB-BD31-4B8C-83A1-F6EECF244321}">
-                <p14:modId xmlns:p14="http://schemas.microsoft.com/office/powerpoint/2010/main" val="1963796920"/>
+                <p14:modId xmlns:p14="http://schemas.microsoft.com/office/powerpoint/2010/main" val="3622613772"/>
               </p:ext>
             </p:extLst>
           </p:nvPr>
         </p:nvGraphicFramePr>
         <p:xfrm>
           <a:off x="609600" y="1397000"/>
-          <a:ext cx="8153400" cy="1854200"/>
+          <a:ext cx="8153400" cy="2225040"/>
         </p:xfrm>
         <a:graphic>
           <a:graphicData uri="http://schemas.openxmlformats.org/drawingml/2006/table">
@@ -3153,6 +3155,36 @@
                     <a:p>
                       <a:r>
                         <a:rPr lang="en-US" dirty="0" smtClean="0"/>
+                        <a:t>State Input</a:t>
+                      </a:r>
+                      <a:endParaRPr lang="en-US" dirty="0"/>
+                    </a:p>
+                  </a:txBody>
+                  <a:tcPr/>
+                </a:tc>
+                <a:tc>
+                  <a:txBody>
+                    <a:bodyPr/>
+                    <a:lstStyle/>
+                    <a:p>
+                      <a:r>
+                        <a:rPr lang="en-US" dirty="0" smtClean="0"/>
+                        <a:t>double</a:t>
+                      </a:r>
+                      <a:endParaRPr lang="en-US" dirty="0"/>
+                    </a:p>
+                  </a:txBody>
+                  <a:tcPr/>
+                </a:tc>
+              </a:tr>
+              <a:tr h="370840">
+                <a:tc>
+                  <a:txBody>
+                    <a:bodyPr/>
+                    <a:lstStyle/>
+                    <a:p>
+                      <a:r>
+                        <a:rPr lang="en-US" dirty="0" smtClean="0"/>
                         <a:t>Vertex</a:t>
                       </a:r>
                       <a:r>
@@ -3315,6 +3347,692 @@
     <p:extLst>
       <p:ext uri="{BB962C8B-B14F-4D97-AF65-F5344CB8AC3E}">
         <p14:creationId xmlns:p14="http://schemas.microsoft.com/office/powerpoint/2010/main" val="210003226"/>
+      </p:ext>
+    </p:extLst>
+  </p:cSld>
+  <p:clrMapOvr>
+    <a:masterClrMapping/>
+  </p:clrMapOvr>
+  <p:timing>
+    <p:tnLst>
+      <p:par>
+        <p:cTn id="1" dur="indefinite" restart="never" nodeType="tmRoot"/>
+      </p:par>
+    </p:tnLst>
+  </p:timing>
+</p:sld>
+</file>
+
+<file path=ppt/slides/slide2.xml><?xml version="1.0" encoding="utf-8"?>
+<p:sld xmlns:a="http://schemas.openxmlformats.org/drawingml/2006/main" xmlns:r="http://schemas.openxmlformats.org/officeDocument/2006/relationships" xmlns:p="http://schemas.openxmlformats.org/presentationml/2006/main">
+  <p:cSld>
+    <p:spTree>
+      <p:nvGrpSpPr>
+        <p:cNvPr id="1" name=""/>
+        <p:cNvGrpSpPr/>
+        <p:nvPr/>
+      </p:nvGrpSpPr>
+      <p:grpSpPr>
+        <a:xfrm>
+          <a:off x="0" y="0"/>
+          <a:ext cx="0" cy="0"/>
+          <a:chOff x="0" y="0"/>
+          <a:chExt cx="0" cy="0"/>
+        </a:xfrm>
+      </p:grpSpPr>
+      <p:graphicFrame>
+        <p:nvGraphicFramePr>
+          <p:cNvPr id="4" name="Table 3"/>
+          <p:cNvGraphicFramePr>
+            <a:graphicFrameLocks noGrp="1"/>
+          </p:cNvGraphicFramePr>
+          <p:nvPr>
+            <p:extLst>
+              <p:ext uri="{D42A27DB-BD31-4B8C-83A1-F6EECF244321}">
+                <p14:modId xmlns:p14="http://schemas.microsoft.com/office/powerpoint/2010/main" val="296961039"/>
+              </p:ext>
+            </p:extLst>
+          </p:nvPr>
+        </p:nvGraphicFramePr>
+        <p:xfrm>
+          <a:off x="609600" y="1397000"/>
+          <a:ext cx="8153400" cy="2494280"/>
+        </p:xfrm>
+        <a:graphic>
+          <a:graphicData uri="http://schemas.openxmlformats.org/drawingml/2006/table">
+            <a:tbl>
+              <a:tblPr firstRow="1" bandRow="1">
+                <a:tableStyleId>{5C22544A-7EE6-4342-B048-85BDC9FD1C3A}</a:tableStyleId>
+              </a:tblPr>
+              <a:tblGrid>
+                <a:gridCol w="2133600"/>
+                <a:gridCol w="6019800"/>
+              </a:tblGrid>
+              <a:tr h="370840">
+                <a:tc>
+                  <a:txBody>
+                    <a:bodyPr/>
+                    <a:lstStyle/>
+                    <a:p>
+                      <a:endParaRPr lang="en-US" dirty="0"/>
+                    </a:p>
+                  </a:txBody>
+                  <a:tcPr/>
+                </a:tc>
+                <a:tc>
+                  <a:txBody>
+                    <a:bodyPr/>
+                    <a:lstStyle/>
+                    <a:p>
+                      <a:endParaRPr lang="en-US"/>
+                    </a:p>
+                  </a:txBody>
+                  <a:tcPr/>
+                </a:tc>
+              </a:tr>
+              <a:tr h="370840">
+                <a:tc>
+                  <a:txBody>
+                    <a:bodyPr/>
+                    <a:lstStyle/>
+                    <a:p>
+                      <a:r>
+                        <a:rPr lang="en-US" dirty="0" smtClean="0"/>
+                        <a:t>State Input</a:t>
+                      </a:r>
+                      <a:endParaRPr lang="en-US" dirty="0"/>
+                    </a:p>
+                  </a:txBody>
+                  <a:tcPr/>
+                </a:tc>
+                <a:tc>
+                  <a:txBody>
+                    <a:bodyPr/>
+                    <a:lstStyle/>
+                    <a:p>
+                      <a:r>
+                        <a:rPr lang="en-US" dirty="0" smtClean="0"/>
+                        <a:t>double</a:t>
+                      </a:r>
+                      <a:endParaRPr lang="en-US" dirty="0"/>
+                    </a:p>
+                  </a:txBody>
+                  <a:tcPr/>
+                </a:tc>
+              </a:tr>
+              <a:tr h="370840">
+                <a:tc>
+                  <a:txBody>
+                    <a:bodyPr/>
+                    <a:lstStyle/>
+                    <a:p>
+                      <a:r>
+                        <a:rPr lang="en-US" dirty="0" smtClean="0"/>
+                        <a:t>Vertex</a:t>
+                      </a:r>
+                      <a:r>
+                        <a:rPr lang="en-US" baseline="0" dirty="0" smtClean="0"/>
+                        <a:t> Input</a:t>
+                      </a:r>
+                      <a:endParaRPr lang="en-US" dirty="0"/>
+                    </a:p>
+                  </a:txBody>
+                  <a:tcPr/>
+                </a:tc>
+                <a:tc>
+                  <a:txBody>
+                    <a:bodyPr/>
+                    <a:lstStyle/>
+                    <a:p>
+                      <a:r>
+                        <a:rPr lang="en-US" dirty="0" err="1" smtClean="0"/>
+                        <a:t>BnVertexInput</a:t>
+                      </a:r>
+                      <a:endParaRPr lang="en-US" dirty="0"/>
+                    </a:p>
+                  </a:txBody>
+                  <a:tcPr/>
+                </a:tc>
+              </a:tr>
+              <a:tr h="370840">
+                <a:tc>
+                  <a:txBody>
+                    <a:bodyPr/>
+                    <a:lstStyle/>
+                    <a:p>
+                      <a:r>
+                        <a:rPr lang="en-US" dirty="0" smtClean="0"/>
+                        <a:t>Graph Input</a:t>
+                      </a:r>
+                      <a:endParaRPr lang="en-US" dirty="0"/>
+                    </a:p>
+                  </a:txBody>
+                  <a:tcPr/>
+                </a:tc>
+                <a:tc>
+                  <a:txBody>
+                    <a:bodyPr/>
+                    <a:lstStyle/>
+                    <a:p>
+                      <a:pPr marL="0" marR="0" indent="0" algn="l" defTabSz="914400" rtl="0" eaLnBrk="1" fontAlgn="auto" latinLnBrk="0" hangingPunct="1">
+                        <a:lnSpc>
+                          <a:spcPct val="100000"/>
+                        </a:lnSpc>
+                        <a:spcBef>
+                          <a:spcPts val="0"/>
+                        </a:spcBef>
+                        <a:spcAft>
+                          <a:spcPts val="0"/>
+                        </a:spcAft>
+                        <a:buClrTx/>
+                        <a:buSzTx/>
+                        <a:buFontTx/>
+                        <a:buNone/>
+                        <a:tabLst/>
+                        <a:defRPr/>
+                      </a:pPr>
+                      <a:r>
+                        <a:rPr lang="en-US" dirty="0" smtClean="0"/>
+                        <a:t>Dictionary&lt;string key, </a:t>
+                      </a:r>
+                      <a:r>
+                        <a:rPr lang="en-US" dirty="0" err="1" smtClean="0"/>
+                        <a:t>BnVertexInput</a:t>
+                      </a:r>
+                      <a:r>
+                        <a:rPr lang="en-US" dirty="0" smtClean="0"/>
+                        <a:t>&gt;</a:t>
+                      </a:r>
+                    </a:p>
+                  </a:txBody>
+                  <a:tcPr/>
+                </a:tc>
+              </a:tr>
+              <a:tr h="370840">
+                <a:tc>
+                  <a:txBody>
+                    <a:bodyPr/>
+                    <a:lstStyle/>
+                    <a:p>
+                      <a:r>
+                        <a:rPr lang="en-US" dirty="0" smtClean="0"/>
+                        <a:t>Location </a:t>
+                      </a:r>
+                      <a:r>
+                        <a:rPr lang="en-US" dirty="0" smtClean="0"/>
+                        <a:t>Input</a:t>
+                      </a:r>
+                      <a:endParaRPr lang="en-US" dirty="0"/>
+                    </a:p>
+                  </a:txBody>
+                  <a:tcPr/>
+                </a:tc>
+                <a:tc>
+                  <a:txBody>
+                    <a:bodyPr/>
+                    <a:lstStyle/>
+                    <a:p>
+                      <a:pPr marL="0" marR="0" indent="0" algn="l" defTabSz="914400" rtl="0" eaLnBrk="1" fontAlgn="auto" latinLnBrk="0" hangingPunct="1">
+                        <a:lnSpc>
+                          <a:spcPct val="100000"/>
+                        </a:lnSpc>
+                        <a:spcBef>
+                          <a:spcPts val="0"/>
+                        </a:spcBef>
+                        <a:spcAft>
+                          <a:spcPts val="0"/>
+                        </a:spcAft>
+                        <a:buClrTx/>
+                        <a:buSzTx/>
+                        <a:buFontTx/>
+                        <a:buNone/>
+                        <a:tabLst/>
+                        <a:defRPr/>
+                      </a:pPr>
+                      <a:r>
+                        <a:rPr lang="en-US" dirty="0" smtClean="0"/>
+                        <a:t>Dictionary&lt;</a:t>
+                      </a:r>
+                      <a:r>
+                        <a:rPr lang="en-US" dirty="0" err="1" smtClean="0"/>
+                        <a:t>int</a:t>
+                      </a:r>
+                      <a:r>
+                        <a:rPr lang="en-US" dirty="0" smtClean="0"/>
+                        <a:t> year, Dictionary&lt;string key, </a:t>
+                      </a:r>
+                      <a:r>
+                        <a:rPr lang="en-US" dirty="0" err="1" smtClean="0"/>
+                        <a:t>BnVertexInput</a:t>
+                      </a:r>
+                      <a:r>
+                        <a:rPr lang="en-US" dirty="0" smtClean="0"/>
+                        <a:t>&gt;&gt;</a:t>
+                      </a:r>
+                      <a:endParaRPr lang="en-US" dirty="0" smtClean="0"/>
+                    </a:p>
+                  </a:txBody>
+                  <a:tcPr/>
+                </a:tc>
+              </a:tr>
+              <a:tr h="370840">
+                <a:tc>
+                  <a:txBody>
+                    <a:bodyPr/>
+                    <a:lstStyle/>
+                    <a:p>
+                      <a:r>
+                        <a:rPr lang="en-US" dirty="0" smtClean="0"/>
+                        <a:t>Pipeline </a:t>
+                      </a:r>
+                      <a:r>
+                        <a:rPr lang="en-US" dirty="0" smtClean="0"/>
+                        <a:t>Input</a:t>
+                      </a:r>
+                      <a:endParaRPr lang="en-US" dirty="0"/>
+                    </a:p>
+                  </a:txBody>
+                  <a:tcPr/>
+                </a:tc>
+                <a:tc>
+                  <a:txBody>
+                    <a:bodyPr/>
+                    <a:lstStyle/>
+                    <a:p>
+                      <a:pPr marL="0" marR="0" indent="0" algn="l" defTabSz="914400" rtl="0" eaLnBrk="1" fontAlgn="auto" latinLnBrk="0" hangingPunct="1">
+                        <a:lnSpc>
+                          <a:spcPct val="100000"/>
+                        </a:lnSpc>
+                        <a:spcBef>
+                          <a:spcPts val="0"/>
+                        </a:spcBef>
+                        <a:spcAft>
+                          <a:spcPts val="0"/>
+                        </a:spcAft>
+                        <a:buClrTx/>
+                        <a:buSzTx/>
+                        <a:buFontTx/>
+                        <a:buNone/>
+                        <a:tabLst/>
+                        <a:defRPr/>
+                      </a:pPr>
+                      <a:r>
+                        <a:rPr lang="en-US" dirty="0" smtClean="0"/>
+                        <a:t>Dictionary&lt;Location, Dictionary&lt;</a:t>
+                      </a:r>
+                      <a:r>
+                        <a:rPr lang="en-US" dirty="0" err="1" smtClean="0"/>
+                        <a:t>int</a:t>
+                      </a:r>
+                      <a:r>
+                        <a:rPr lang="en-US" dirty="0" smtClean="0"/>
+                        <a:t> year, Dictionary&lt;string key, </a:t>
+                      </a:r>
+                      <a:r>
+                        <a:rPr lang="en-US" dirty="0" err="1" smtClean="0"/>
+                        <a:t>BnVertexInput</a:t>
+                      </a:r>
+                      <a:r>
+                        <a:rPr lang="en-US" dirty="0" smtClean="0"/>
+                        <a:t>&gt;&gt;&gt;</a:t>
+                      </a:r>
+                    </a:p>
+                  </a:txBody>
+                  <a:tcPr/>
+                </a:tc>
+              </a:tr>
+            </a:tbl>
+          </a:graphicData>
+        </a:graphic>
+      </p:graphicFrame>
+    </p:spTree>
+    <p:extLst>
+      <p:ext uri="{BB962C8B-B14F-4D97-AF65-F5344CB8AC3E}">
+        <p14:creationId xmlns:p14="http://schemas.microsoft.com/office/powerpoint/2010/main" val="207630835"/>
+      </p:ext>
+    </p:extLst>
+  </p:cSld>
+  <p:clrMapOvr>
+    <a:masterClrMapping/>
+  </p:clrMapOvr>
+  <p:timing>
+    <p:tnLst>
+      <p:par>
+        <p:cTn id="1" dur="indefinite" restart="never" nodeType="tmRoot"/>
+      </p:par>
+    </p:tnLst>
+  </p:timing>
+</p:sld>
+</file>
+
+<file path=ppt/slides/slide3.xml><?xml version="1.0" encoding="utf-8"?>
+<p:sld xmlns:a="http://schemas.openxmlformats.org/drawingml/2006/main" xmlns:r="http://schemas.openxmlformats.org/officeDocument/2006/relationships" xmlns:p="http://schemas.openxmlformats.org/presentationml/2006/main">
+  <p:cSld>
+    <p:spTree>
+      <p:nvGrpSpPr>
+        <p:cNvPr id="1" name=""/>
+        <p:cNvGrpSpPr/>
+        <p:nvPr/>
+      </p:nvGrpSpPr>
+      <p:grpSpPr>
+        <a:xfrm>
+          <a:off x="0" y="0"/>
+          <a:ext cx="0" cy="0"/>
+          <a:chOff x="0" y="0"/>
+          <a:chExt cx="0" cy="0"/>
+        </a:xfrm>
+      </p:grpSpPr>
+      <p:graphicFrame>
+        <p:nvGraphicFramePr>
+          <p:cNvPr id="4" name="Table 3"/>
+          <p:cNvGraphicFramePr>
+            <a:graphicFrameLocks noGrp="1"/>
+          </p:cNvGraphicFramePr>
+          <p:nvPr>
+            <p:extLst>
+              <p:ext uri="{D42A27DB-BD31-4B8C-83A1-F6EECF244321}">
+                <p14:modId xmlns:p14="http://schemas.microsoft.com/office/powerpoint/2010/main" val="802522497"/>
+              </p:ext>
+            </p:extLst>
+          </p:nvPr>
+        </p:nvGraphicFramePr>
+        <p:xfrm>
+          <a:off x="609600" y="1397000"/>
+          <a:ext cx="8153400" cy="2763520"/>
+        </p:xfrm>
+        <a:graphic>
+          <a:graphicData uri="http://schemas.openxmlformats.org/drawingml/2006/table">
+            <a:tbl>
+              <a:tblPr firstRow="1" bandRow="1">
+                <a:tableStyleId>{5C22544A-7EE6-4342-B048-85BDC9FD1C3A}</a:tableStyleId>
+              </a:tblPr>
+              <a:tblGrid>
+                <a:gridCol w="2133600"/>
+                <a:gridCol w="6019800"/>
+              </a:tblGrid>
+              <a:tr h="370840">
+                <a:tc>
+                  <a:txBody>
+                    <a:bodyPr/>
+                    <a:lstStyle/>
+                    <a:p>
+                      <a:endParaRPr lang="en-US" dirty="0"/>
+                    </a:p>
+                  </a:txBody>
+                  <a:tcPr/>
+                </a:tc>
+                <a:tc>
+                  <a:txBody>
+                    <a:bodyPr/>
+                    <a:lstStyle/>
+                    <a:p>
+                      <a:endParaRPr lang="en-US"/>
+                    </a:p>
+                  </a:txBody>
+                  <a:tcPr/>
+                </a:tc>
+              </a:tr>
+              <a:tr h="370840">
+                <a:tc>
+                  <a:txBody>
+                    <a:bodyPr/>
+                    <a:lstStyle/>
+                    <a:p>
+                      <a:r>
+                        <a:rPr lang="en-US" dirty="0" smtClean="0"/>
+                        <a:t>State Value</a:t>
+                      </a:r>
+                      <a:endParaRPr lang="en-US" dirty="0"/>
+                    </a:p>
+                  </a:txBody>
+                  <a:tcPr/>
+                </a:tc>
+                <a:tc>
+                  <a:txBody>
+                    <a:bodyPr/>
+                    <a:lstStyle/>
+                    <a:p>
+                      <a:r>
+                        <a:rPr lang="en-US" dirty="0" smtClean="0"/>
+                        <a:t>double</a:t>
+                      </a:r>
+                      <a:endParaRPr lang="en-US" dirty="0"/>
+                    </a:p>
+                  </a:txBody>
+                  <a:tcPr/>
+                </a:tc>
+              </a:tr>
+              <a:tr h="370840">
+                <a:tc>
+                  <a:txBody>
+                    <a:bodyPr/>
+                    <a:lstStyle/>
+                    <a:p>
+                      <a:r>
+                        <a:rPr lang="en-US" dirty="0" smtClean="0"/>
+                        <a:t>Vertex</a:t>
+                      </a:r>
+                      <a:r>
+                        <a:rPr lang="en-US" baseline="0" dirty="0" smtClean="0"/>
+                        <a:t> </a:t>
+                      </a:r>
+                      <a:r>
+                        <a:rPr lang="en-US" baseline="0" dirty="0" smtClean="0"/>
+                        <a:t>Value</a:t>
+                      </a:r>
+                      <a:endParaRPr lang="en-US" dirty="0"/>
+                    </a:p>
+                  </a:txBody>
+                  <a:tcPr/>
+                </a:tc>
+                <a:tc>
+                  <a:txBody>
+                    <a:bodyPr/>
+                    <a:lstStyle/>
+                    <a:p>
+                      <a:r>
+                        <a:rPr lang="en-US" dirty="0" smtClean="0"/>
+                        <a:t>Dictionary&lt;string key, double&gt;</a:t>
+                      </a:r>
+                      <a:endParaRPr lang="en-US" dirty="0"/>
+                    </a:p>
+                  </a:txBody>
+                  <a:tcPr/>
+                </a:tc>
+              </a:tr>
+              <a:tr h="370840">
+                <a:tc>
+                  <a:txBody>
+                    <a:bodyPr/>
+                    <a:lstStyle/>
+                    <a:p>
+                      <a:r>
+                        <a:rPr lang="en-US" dirty="0" smtClean="0"/>
+                        <a:t>Graph </a:t>
+                      </a:r>
+                      <a:r>
+                        <a:rPr lang="en-US" dirty="0" smtClean="0"/>
+                        <a:t>Value</a:t>
+                      </a:r>
+                      <a:endParaRPr lang="en-US" dirty="0"/>
+                    </a:p>
+                  </a:txBody>
+                  <a:tcPr/>
+                </a:tc>
+                <a:tc>
+                  <a:txBody>
+                    <a:bodyPr/>
+                    <a:lstStyle/>
+                    <a:p>
+                      <a:pPr marL="0" marR="0" indent="0" algn="l" defTabSz="914400" rtl="0" eaLnBrk="1" fontAlgn="auto" latinLnBrk="0" hangingPunct="1">
+                        <a:lnSpc>
+                          <a:spcPct val="100000"/>
+                        </a:lnSpc>
+                        <a:spcBef>
+                          <a:spcPts val="0"/>
+                        </a:spcBef>
+                        <a:spcAft>
+                          <a:spcPts val="0"/>
+                        </a:spcAft>
+                        <a:buClrTx/>
+                        <a:buSzTx/>
+                        <a:buFontTx/>
+                        <a:buNone/>
+                        <a:tabLst/>
+                        <a:defRPr/>
+                      </a:pPr>
+                      <a:r>
+                        <a:rPr lang="en-US" dirty="0" smtClean="0"/>
+                        <a:t>Dictionary&lt;string key,</a:t>
+                      </a:r>
+                      <a:r>
+                        <a:rPr lang="en-US" baseline="0" dirty="0" smtClean="0"/>
+                        <a:t> </a:t>
+                      </a:r>
+                      <a:r>
+                        <a:rPr lang="en-US" dirty="0" smtClean="0"/>
+                        <a:t>Dictionary&lt;string key, double&gt;&gt;</a:t>
+                      </a:r>
+                      <a:endParaRPr lang="en-US" dirty="0"/>
+                    </a:p>
+                  </a:txBody>
+                  <a:tcPr/>
+                </a:tc>
+              </a:tr>
+              <a:tr h="370840">
+                <a:tc>
+                  <a:txBody>
+                    <a:bodyPr/>
+                    <a:lstStyle/>
+                    <a:p>
+                      <a:r>
+                        <a:rPr lang="en-US" dirty="0" smtClean="0"/>
+                        <a:t>Location Value</a:t>
+                      </a:r>
+                      <a:endParaRPr lang="en-US" dirty="0"/>
+                    </a:p>
+                  </a:txBody>
+                  <a:tcPr/>
+                </a:tc>
+                <a:tc>
+                  <a:txBody>
+                    <a:bodyPr/>
+                    <a:lstStyle/>
+                    <a:p>
+                      <a:pPr marL="0" marR="0" indent="0" algn="l" defTabSz="914400" rtl="0" eaLnBrk="1" fontAlgn="auto" latinLnBrk="0" hangingPunct="1">
+                        <a:lnSpc>
+                          <a:spcPct val="100000"/>
+                        </a:lnSpc>
+                        <a:spcBef>
+                          <a:spcPts val="0"/>
+                        </a:spcBef>
+                        <a:spcAft>
+                          <a:spcPts val="0"/>
+                        </a:spcAft>
+                        <a:buClrTx/>
+                        <a:buSzTx/>
+                        <a:buFontTx/>
+                        <a:buNone/>
+                        <a:tabLst/>
+                        <a:defRPr/>
+                      </a:pPr>
+                      <a:r>
+                        <a:rPr lang="en-US" dirty="0" smtClean="0"/>
+                        <a:t>Dictionary&lt;</a:t>
+                      </a:r>
+                      <a:r>
+                        <a:rPr lang="en-US" dirty="0" err="1" smtClean="0"/>
+                        <a:t>int</a:t>
+                      </a:r>
+                      <a:r>
+                        <a:rPr lang="en-US" dirty="0" smtClean="0"/>
+                        <a:t> year, Dictionary&lt;string key,</a:t>
+                      </a:r>
+                      <a:r>
+                        <a:rPr lang="en-US" baseline="0" dirty="0" smtClean="0"/>
+                        <a:t> </a:t>
+                      </a:r>
+                      <a:r>
+                        <a:rPr lang="en-US" dirty="0" smtClean="0"/>
+                        <a:t>Dictionary&lt;string key, double&gt;&gt;&gt;</a:t>
+                      </a:r>
+                      <a:endParaRPr lang="en-US" dirty="0" smtClean="0"/>
+                    </a:p>
+                  </a:txBody>
+                  <a:tcPr/>
+                </a:tc>
+              </a:tr>
+              <a:tr h="370840">
+                <a:tc>
+                  <a:txBody>
+                    <a:bodyPr/>
+                    <a:lstStyle/>
+                    <a:p>
+                      <a:r>
+                        <a:rPr lang="en-US" dirty="0" smtClean="0"/>
+                        <a:t>Pipeline Value</a:t>
+                      </a:r>
+                      <a:endParaRPr lang="en-US" dirty="0"/>
+                    </a:p>
+                  </a:txBody>
+                  <a:tcPr/>
+                </a:tc>
+                <a:tc>
+                  <a:txBody>
+                    <a:bodyPr/>
+                    <a:lstStyle/>
+                    <a:p>
+                      <a:pPr marL="0" marR="0" indent="0" algn="l" defTabSz="914400" rtl="0" eaLnBrk="1" fontAlgn="auto" latinLnBrk="0" hangingPunct="1">
+                        <a:lnSpc>
+                          <a:spcPct val="100000"/>
+                        </a:lnSpc>
+                        <a:spcBef>
+                          <a:spcPts val="0"/>
+                        </a:spcBef>
+                        <a:spcAft>
+                          <a:spcPts val="0"/>
+                        </a:spcAft>
+                        <a:buClrTx/>
+                        <a:buSzTx/>
+                        <a:buFontTx/>
+                        <a:buNone/>
+                        <a:tabLst/>
+                        <a:defRPr/>
+                      </a:pPr>
+                      <a:r>
+                        <a:rPr lang="en-US" dirty="0" smtClean="0"/>
+                        <a:t>Dictionary&lt;Location, Dictionary&lt;</a:t>
+                      </a:r>
+                      <a:r>
+                        <a:rPr lang="en-US" dirty="0" err="1" smtClean="0"/>
+                        <a:t>int</a:t>
+                      </a:r>
+                      <a:r>
+                        <a:rPr lang="en-US" dirty="0" smtClean="0"/>
+                        <a:t> year, Dictionary&lt;string key,</a:t>
+                      </a:r>
+                      <a:r>
+                        <a:rPr lang="en-US" baseline="0" dirty="0" smtClean="0"/>
+                        <a:t> </a:t>
+                      </a:r>
+                      <a:r>
+                        <a:rPr lang="en-US" dirty="0" smtClean="0"/>
+                        <a:t>Dictionary&lt;string key, double&gt;&gt;&gt;&gt;</a:t>
+                      </a:r>
+                      <a:endParaRPr lang="en-US" dirty="0" smtClean="0"/>
+                    </a:p>
+                  </a:txBody>
+                  <a:tcPr/>
+                </a:tc>
+              </a:tr>
+            </a:tbl>
+          </a:graphicData>
+        </a:graphic>
+      </p:graphicFrame>
+    </p:spTree>
+    <p:extLst>
+      <p:ext uri="{BB962C8B-B14F-4D97-AF65-F5344CB8AC3E}">
+        <p14:creationId xmlns:p14="http://schemas.microsoft.com/office/powerpoint/2010/main" val="3200389012"/>
       </p:ext>
     </p:extLst>
   </p:cSld>

</xml_diff>